<commit_message>
Bundling nsd.bat and other ongoing work.
</commit_message>
<xml_diff>
--- a/release-engineering.pptx
+++ b/release-engineering.pptx
@@ -9861,7 +9861,7 @@
           <p:nvPr>
             <p:extLst>
               <p:ext uri="{D42A27DB-BD31-4B8C-83A1-F6EECF244321}">
-                <p14:modId xmlns:p14="http://schemas.microsoft.com/office/powerpoint/2010/main" val="3598253249"/>
+                <p14:modId xmlns:p14="http://schemas.microsoft.com/office/powerpoint/2010/main" val="652949842"/>
               </p:ext>
             </p:extLst>
           </p:nvPr>
@@ -10192,7 +10192,16 @@
                           <a:ea typeface="Calibri" panose="020F0502020204030204" pitchFamily="34" charset="0"/>
                           <a:cs typeface="Times New Roman" panose="02020603050405020304" pitchFamily="18" charset="0"/>
                         </a:rPr>
-                        <a:t>Once a feature is implemented it is merged into develop. First, develop is merged into the feature branch and any merge conflicts and other problems are resolved. Then the feature branch is merged into develop with --no-ff option is order to preserve branching history. Once merged, the feature branch is deleted. The pipeline build is executed.</a:t>
+                        <a:t>Once a feature is implemented it is merged into develop. First, develop is merged into the feature branch and any merge conflicts and other problems are resolved. Then the feature branch is merged into develop with --no-ff option is order to preserve branching history. Once merged, the feature branch is deleted. The pipeline build is executed. The feature branch directory on the web </a:t>
+                      </a:r>
+                      <a:r>
+                        <a:rPr lang="en-US" sz="1000">
+                          <a:effectLst/>
+                          <a:latin typeface="+mn-lt"/>
+                          <a:ea typeface="Calibri" panose="020F0502020204030204" pitchFamily="34" charset="0"/>
+                          <a:cs typeface="Times New Roman" panose="02020603050405020304" pitchFamily="18" charset="0"/>
+                        </a:rPr>
+                        <a:t>server is deleted.</a:t>
                       </a:r>
                       <a:endParaRPr lang="en-US" sz="1100" dirty="0">
                         <a:effectLst/>

</xml_diff>